<commit_message>
Add failing test for adding existing picture to slide
Starting #935
</commit_message>
<xml_diff>
--- a/test/ShapeCrawler.Tests.Unit/Assets/053_add_shapes.pptx
+++ b/test/ShapeCrawler.Tests.Unit/Assets/053_add_shapes.pptx
@@ -155,7 +155,7 @@
           </a:lstStyle>
           <a:p>
             <a:r>
-              <a:rPr lang="es-ES" smtClean="0"/>
+              <a:rPr lang="es-ES"/>
               <a:t>Haga clic para modificar el estilo de título del patrón</a:t>
             </a:r>
             <a:endParaRPr lang="es-MX"/>
@@ -220,7 +220,7 @@
           </a:lstStyle>
           <a:p>
             <a:r>
-              <a:rPr lang="es-ES" smtClean="0"/>
+              <a:rPr lang="es-ES"/>
               <a:t>Haga clic para editar el estilo de subtítulo del patrón</a:t>
             </a:r>
             <a:endParaRPr lang="es-MX"/>
@@ -244,7 +244,7 @@
           <a:p>
             <a:fld id="{606ECCC5-4546-4098-9A3E-05B68676E7CD}" type="datetimeFigureOut">
               <a:rPr lang="es-MX" smtClean="0"/>
-              <a:t>04/07/2023</a:t>
+              <a:t>15/02/2025</a:t>
             </a:fld>
             <a:endParaRPr lang="es-MX"/>
           </a:p>
@@ -286,7 +286,7 @@
           <a:p>
             <a:fld id="{3B215A83-C96B-45C2-ABAB-8051C7893C1E}" type="slidenum">
               <a:rPr lang="es-MX" smtClean="0"/>
-              <a:t>‹Nº›</a:t>
+              <a:t>‹#›</a:t>
             </a:fld>
             <a:endParaRPr lang="es-MX"/>
           </a:p>
@@ -338,7 +338,7 @@
           <a:lstStyle/>
           <a:p>
             <a:r>
-              <a:rPr lang="es-ES" smtClean="0"/>
+              <a:rPr lang="es-ES"/>
               <a:t>Haga clic para modificar el estilo de título del patrón</a:t>
             </a:r>
             <a:endParaRPr lang="es-MX"/>
@@ -362,35 +362,35 @@
           <a:p>
             <a:pPr lvl="0"/>
             <a:r>
-              <a:rPr lang="es-ES" smtClean="0"/>
+              <a:rPr lang="es-ES"/>
               <a:t>Editar el estilo de texto del patrón</a:t>
             </a:r>
           </a:p>
           <a:p>
             <a:pPr lvl="1"/>
             <a:r>
-              <a:rPr lang="es-ES" smtClean="0"/>
+              <a:rPr lang="es-ES"/>
               <a:t>Segundo nivel</a:t>
             </a:r>
           </a:p>
           <a:p>
             <a:pPr lvl="2"/>
             <a:r>
-              <a:rPr lang="es-ES" smtClean="0"/>
+              <a:rPr lang="es-ES"/>
               <a:t>Tercer nivel</a:t>
             </a:r>
           </a:p>
           <a:p>
             <a:pPr lvl="3"/>
             <a:r>
-              <a:rPr lang="es-ES" smtClean="0"/>
+              <a:rPr lang="es-ES"/>
               <a:t>Cuarto nivel</a:t>
             </a:r>
           </a:p>
           <a:p>
             <a:pPr lvl="4"/>
             <a:r>
-              <a:rPr lang="es-ES" smtClean="0"/>
+              <a:rPr lang="es-ES"/>
               <a:t>Quinto nivel</a:t>
             </a:r>
             <a:endParaRPr lang="es-MX"/>
@@ -414,7 +414,7 @@
           <a:p>
             <a:fld id="{606ECCC5-4546-4098-9A3E-05B68676E7CD}" type="datetimeFigureOut">
               <a:rPr lang="es-MX" smtClean="0"/>
-              <a:t>04/07/2023</a:t>
+              <a:t>15/02/2025</a:t>
             </a:fld>
             <a:endParaRPr lang="es-MX"/>
           </a:p>
@@ -456,7 +456,7 @@
           <a:p>
             <a:fld id="{3B215A83-C96B-45C2-ABAB-8051C7893C1E}" type="slidenum">
               <a:rPr lang="es-MX" smtClean="0"/>
-              <a:t>‹Nº›</a:t>
+              <a:t>‹#›</a:t>
             </a:fld>
             <a:endParaRPr lang="es-MX"/>
           </a:p>
@@ -513,7 +513,7 @@
           <a:lstStyle/>
           <a:p>
             <a:r>
-              <a:rPr lang="es-ES" smtClean="0"/>
+              <a:rPr lang="es-ES"/>
               <a:t>Haga clic para modificar el estilo de título del patrón</a:t>
             </a:r>
             <a:endParaRPr lang="es-MX"/>
@@ -542,35 +542,35 @@
           <a:p>
             <a:pPr lvl="0"/>
             <a:r>
-              <a:rPr lang="es-ES" smtClean="0"/>
+              <a:rPr lang="es-ES"/>
               <a:t>Editar el estilo de texto del patrón</a:t>
             </a:r>
           </a:p>
           <a:p>
             <a:pPr lvl="1"/>
             <a:r>
-              <a:rPr lang="es-ES" smtClean="0"/>
+              <a:rPr lang="es-ES"/>
               <a:t>Segundo nivel</a:t>
             </a:r>
           </a:p>
           <a:p>
             <a:pPr lvl="2"/>
             <a:r>
-              <a:rPr lang="es-ES" smtClean="0"/>
+              <a:rPr lang="es-ES"/>
               <a:t>Tercer nivel</a:t>
             </a:r>
           </a:p>
           <a:p>
             <a:pPr lvl="3"/>
             <a:r>
-              <a:rPr lang="es-ES" smtClean="0"/>
+              <a:rPr lang="es-ES"/>
               <a:t>Cuarto nivel</a:t>
             </a:r>
           </a:p>
           <a:p>
             <a:pPr lvl="4"/>
             <a:r>
-              <a:rPr lang="es-ES" smtClean="0"/>
+              <a:rPr lang="es-ES"/>
               <a:t>Quinto nivel</a:t>
             </a:r>
             <a:endParaRPr lang="es-MX"/>
@@ -594,7 +594,7 @@
           <a:p>
             <a:fld id="{606ECCC5-4546-4098-9A3E-05B68676E7CD}" type="datetimeFigureOut">
               <a:rPr lang="es-MX" smtClean="0"/>
-              <a:t>04/07/2023</a:t>
+              <a:t>15/02/2025</a:t>
             </a:fld>
             <a:endParaRPr lang="es-MX"/>
           </a:p>
@@ -636,7 +636,7 @@
           <a:p>
             <a:fld id="{3B215A83-C96B-45C2-ABAB-8051C7893C1E}" type="slidenum">
               <a:rPr lang="es-MX" smtClean="0"/>
-              <a:t>‹Nº›</a:t>
+              <a:t>‹#›</a:t>
             </a:fld>
             <a:endParaRPr lang="es-MX"/>
           </a:p>
@@ -688,7 +688,7 @@
           <a:lstStyle/>
           <a:p>
             <a:r>
-              <a:rPr lang="es-ES" smtClean="0"/>
+              <a:rPr lang="es-ES"/>
               <a:t>Haga clic para modificar el estilo de título del patrón</a:t>
             </a:r>
             <a:endParaRPr lang="es-MX"/>
@@ -712,35 +712,35 @@
           <a:p>
             <a:pPr lvl="0"/>
             <a:r>
-              <a:rPr lang="es-ES" smtClean="0"/>
+              <a:rPr lang="es-ES"/>
               <a:t>Editar el estilo de texto del patrón</a:t>
             </a:r>
           </a:p>
           <a:p>
             <a:pPr lvl="1"/>
             <a:r>
-              <a:rPr lang="es-ES" smtClean="0"/>
+              <a:rPr lang="es-ES"/>
               <a:t>Segundo nivel</a:t>
             </a:r>
           </a:p>
           <a:p>
             <a:pPr lvl="2"/>
             <a:r>
-              <a:rPr lang="es-ES" smtClean="0"/>
+              <a:rPr lang="es-ES"/>
               <a:t>Tercer nivel</a:t>
             </a:r>
           </a:p>
           <a:p>
             <a:pPr lvl="3"/>
             <a:r>
-              <a:rPr lang="es-ES" smtClean="0"/>
+              <a:rPr lang="es-ES"/>
               <a:t>Cuarto nivel</a:t>
             </a:r>
           </a:p>
           <a:p>
             <a:pPr lvl="4"/>
             <a:r>
-              <a:rPr lang="es-ES" smtClean="0"/>
+              <a:rPr lang="es-ES"/>
               <a:t>Quinto nivel</a:t>
             </a:r>
             <a:endParaRPr lang="es-MX"/>
@@ -764,7 +764,7 @@
           <a:p>
             <a:fld id="{606ECCC5-4546-4098-9A3E-05B68676E7CD}" type="datetimeFigureOut">
               <a:rPr lang="es-MX" smtClean="0"/>
-              <a:t>04/07/2023</a:t>
+              <a:t>15/02/2025</a:t>
             </a:fld>
             <a:endParaRPr lang="es-MX"/>
           </a:p>
@@ -806,7 +806,7 @@
           <a:p>
             <a:fld id="{3B215A83-C96B-45C2-ABAB-8051C7893C1E}" type="slidenum">
               <a:rPr lang="es-MX" smtClean="0"/>
-              <a:t>‹Nº›</a:t>
+              <a:t>‹#›</a:t>
             </a:fld>
             <a:endParaRPr lang="es-MX"/>
           </a:p>
@@ -867,7 +867,7 @@
           </a:lstStyle>
           <a:p>
             <a:r>
-              <a:rPr lang="es-ES" smtClean="0"/>
+              <a:rPr lang="es-ES"/>
               <a:t>Haga clic para modificar el estilo de título del patrón</a:t>
             </a:r>
             <a:endParaRPr lang="es-MX"/>
@@ -987,7 +987,7 @@
           <a:p>
             <a:pPr lvl="0"/>
             <a:r>
-              <a:rPr lang="es-ES" smtClean="0"/>
+              <a:rPr lang="es-ES"/>
               <a:t>Editar el estilo de texto del patrón</a:t>
             </a:r>
           </a:p>
@@ -1010,7 +1010,7 @@
           <a:p>
             <a:fld id="{606ECCC5-4546-4098-9A3E-05B68676E7CD}" type="datetimeFigureOut">
               <a:rPr lang="es-MX" smtClean="0"/>
-              <a:t>04/07/2023</a:t>
+              <a:t>15/02/2025</a:t>
             </a:fld>
             <a:endParaRPr lang="es-MX"/>
           </a:p>
@@ -1052,7 +1052,7 @@
           <a:p>
             <a:fld id="{3B215A83-C96B-45C2-ABAB-8051C7893C1E}" type="slidenum">
               <a:rPr lang="es-MX" smtClean="0"/>
-              <a:t>‹Nº›</a:t>
+              <a:t>‹#›</a:t>
             </a:fld>
             <a:endParaRPr lang="es-MX"/>
           </a:p>
@@ -1104,7 +1104,7 @@
           <a:lstStyle/>
           <a:p>
             <a:r>
-              <a:rPr lang="es-ES" smtClean="0"/>
+              <a:rPr lang="es-ES"/>
               <a:t>Haga clic para modificar el estilo de título del patrón</a:t>
             </a:r>
             <a:endParaRPr lang="es-MX"/>
@@ -1133,35 +1133,35 @@
           <a:p>
             <a:pPr lvl="0"/>
             <a:r>
-              <a:rPr lang="es-ES" smtClean="0"/>
+              <a:rPr lang="es-ES"/>
               <a:t>Editar el estilo de texto del patrón</a:t>
             </a:r>
           </a:p>
           <a:p>
             <a:pPr lvl="1"/>
             <a:r>
-              <a:rPr lang="es-ES" smtClean="0"/>
+              <a:rPr lang="es-ES"/>
               <a:t>Segundo nivel</a:t>
             </a:r>
           </a:p>
           <a:p>
             <a:pPr lvl="2"/>
             <a:r>
-              <a:rPr lang="es-ES" smtClean="0"/>
+              <a:rPr lang="es-ES"/>
               <a:t>Tercer nivel</a:t>
             </a:r>
           </a:p>
           <a:p>
             <a:pPr lvl="3"/>
             <a:r>
-              <a:rPr lang="es-ES" smtClean="0"/>
+              <a:rPr lang="es-ES"/>
               <a:t>Cuarto nivel</a:t>
             </a:r>
           </a:p>
           <a:p>
             <a:pPr lvl="4"/>
             <a:r>
-              <a:rPr lang="es-ES" smtClean="0"/>
+              <a:rPr lang="es-ES"/>
               <a:t>Quinto nivel</a:t>
             </a:r>
             <a:endParaRPr lang="es-MX"/>
@@ -1190,35 +1190,35 @@
           <a:p>
             <a:pPr lvl="0"/>
             <a:r>
-              <a:rPr lang="es-ES" smtClean="0"/>
+              <a:rPr lang="es-ES"/>
               <a:t>Editar el estilo de texto del patrón</a:t>
             </a:r>
           </a:p>
           <a:p>
             <a:pPr lvl="1"/>
             <a:r>
-              <a:rPr lang="es-ES" smtClean="0"/>
+              <a:rPr lang="es-ES"/>
               <a:t>Segundo nivel</a:t>
             </a:r>
           </a:p>
           <a:p>
             <a:pPr lvl="2"/>
             <a:r>
-              <a:rPr lang="es-ES" smtClean="0"/>
+              <a:rPr lang="es-ES"/>
               <a:t>Tercer nivel</a:t>
             </a:r>
           </a:p>
           <a:p>
             <a:pPr lvl="3"/>
             <a:r>
-              <a:rPr lang="es-ES" smtClean="0"/>
+              <a:rPr lang="es-ES"/>
               <a:t>Cuarto nivel</a:t>
             </a:r>
           </a:p>
           <a:p>
             <a:pPr lvl="4"/>
             <a:r>
-              <a:rPr lang="es-ES" smtClean="0"/>
+              <a:rPr lang="es-ES"/>
               <a:t>Quinto nivel</a:t>
             </a:r>
             <a:endParaRPr lang="es-MX"/>
@@ -1242,7 +1242,7 @@
           <a:p>
             <a:fld id="{606ECCC5-4546-4098-9A3E-05B68676E7CD}" type="datetimeFigureOut">
               <a:rPr lang="es-MX" smtClean="0"/>
-              <a:t>04/07/2023</a:t>
+              <a:t>15/02/2025</a:t>
             </a:fld>
             <a:endParaRPr lang="es-MX"/>
           </a:p>
@@ -1284,7 +1284,7 @@
           <a:p>
             <a:fld id="{3B215A83-C96B-45C2-ABAB-8051C7893C1E}" type="slidenum">
               <a:rPr lang="es-MX" smtClean="0"/>
-              <a:t>‹Nº›</a:t>
+              <a:t>‹#›</a:t>
             </a:fld>
             <a:endParaRPr lang="es-MX"/>
           </a:p>
@@ -1341,7 +1341,7 @@
           <a:lstStyle/>
           <a:p>
             <a:r>
-              <a:rPr lang="es-ES" smtClean="0"/>
+              <a:rPr lang="es-ES"/>
               <a:t>Haga clic para modificar el estilo de título del patrón</a:t>
             </a:r>
             <a:endParaRPr lang="es-MX"/>
@@ -1407,7 +1407,7 @@
           <a:p>
             <a:pPr lvl="0"/>
             <a:r>
-              <a:rPr lang="es-ES" smtClean="0"/>
+              <a:rPr lang="es-ES"/>
               <a:t>Editar el estilo de texto del patrón</a:t>
             </a:r>
           </a:p>
@@ -1435,35 +1435,35 @@
           <a:p>
             <a:pPr lvl="0"/>
             <a:r>
-              <a:rPr lang="es-ES" smtClean="0"/>
+              <a:rPr lang="es-ES"/>
               <a:t>Editar el estilo de texto del patrón</a:t>
             </a:r>
           </a:p>
           <a:p>
             <a:pPr lvl="1"/>
             <a:r>
-              <a:rPr lang="es-ES" smtClean="0"/>
+              <a:rPr lang="es-ES"/>
               <a:t>Segundo nivel</a:t>
             </a:r>
           </a:p>
           <a:p>
             <a:pPr lvl="2"/>
             <a:r>
-              <a:rPr lang="es-ES" smtClean="0"/>
+              <a:rPr lang="es-ES"/>
               <a:t>Tercer nivel</a:t>
             </a:r>
           </a:p>
           <a:p>
             <a:pPr lvl="3"/>
             <a:r>
-              <a:rPr lang="es-ES" smtClean="0"/>
+              <a:rPr lang="es-ES"/>
               <a:t>Cuarto nivel</a:t>
             </a:r>
           </a:p>
           <a:p>
             <a:pPr lvl="4"/>
             <a:r>
-              <a:rPr lang="es-ES" smtClean="0"/>
+              <a:rPr lang="es-ES"/>
               <a:t>Quinto nivel</a:t>
             </a:r>
             <a:endParaRPr lang="es-MX"/>
@@ -1529,7 +1529,7 @@
           <a:p>
             <a:pPr lvl="0"/>
             <a:r>
-              <a:rPr lang="es-ES" smtClean="0"/>
+              <a:rPr lang="es-ES"/>
               <a:t>Editar el estilo de texto del patrón</a:t>
             </a:r>
           </a:p>
@@ -1557,35 +1557,35 @@
           <a:p>
             <a:pPr lvl="0"/>
             <a:r>
-              <a:rPr lang="es-ES" smtClean="0"/>
+              <a:rPr lang="es-ES"/>
               <a:t>Editar el estilo de texto del patrón</a:t>
             </a:r>
           </a:p>
           <a:p>
             <a:pPr lvl="1"/>
             <a:r>
-              <a:rPr lang="es-ES" smtClean="0"/>
+              <a:rPr lang="es-ES"/>
               <a:t>Segundo nivel</a:t>
             </a:r>
           </a:p>
           <a:p>
             <a:pPr lvl="2"/>
             <a:r>
-              <a:rPr lang="es-ES" smtClean="0"/>
+              <a:rPr lang="es-ES"/>
               <a:t>Tercer nivel</a:t>
             </a:r>
           </a:p>
           <a:p>
             <a:pPr lvl="3"/>
             <a:r>
-              <a:rPr lang="es-ES" smtClean="0"/>
+              <a:rPr lang="es-ES"/>
               <a:t>Cuarto nivel</a:t>
             </a:r>
           </a:p>
           <a:p>
             <a:pPr lvl="4"/>
             <a:r>
-              <a:rPr lang="es-ES" smtClean="0"/>
+              <a:rPr lang="es-ES"/>
               <a:t>Quinto nivel</a:t>
             </a:r>
             <a:endParaRPr lang="es-MX"/>
@@ -1609,7 +1609,7 @@
           <a:p>
             <a:fld id="{606ECCC5-4546-4098-9A3E-05B68676E7CD}" type="datetimeFigureOut">
               <a:rPr lang="es-MX" smtClean="0"/>
-              <a:t>04/07/2023</a:t>
+              <a:t>15/02/2025</a:t>
             </a:fld>
             <a:endParaRPr lang="es-MX"/>
           </a:p>
@@ -1651,7 +1651,7 @@
           <a:p>
             <a:fld id="{3B215A83-C96B-45C2-ABAB-8051C7893C1E}" type="slidenum">
               <a:rPr lang="es-MX" smtClean="0"/>
-              <a:t>‹Nº›</a:t>
+              <a:t>‹#›</a:t>
             </a:fld>
             <a:endParaRPr lang="es-MX"/>
           </a:p>
@@ -1703,7 +1703,7 @@
           <a:lstStyle/>
           <a:p>
             <a:r>
-              <a:rPr lang="es-ES" smtClean="0"/>
+              <a:rPr lang="es-ES"/>
               <a:t>Haga clic para modificar el estilo de título del patrón</a:t>
             </a:r>
             <a:endParaRPr lang="es-MX"/>
@@ -1727,7 +1727,7 @@
           <a:p>
             <a:fld id="{606ECCC5-4546-4098-9A3E-05B68676E7CD}" type="datetimeFigureOut">
               <a:rPr lang="es-MX" smtClean="0"/>
-              <a:t>04/07/2023</a:t>
+              <a:t>15/02/2025</a:t>
             </a:fld>
             <a:endParaRPr lang="es-MX"/>
           </a:p>
@@ -1769,7 +1769,7 @@
           <a:p>
             <a:fld id="{3B215A83-C96B-45C2-ABAB-8051C7893C1E}" type="slidenum">
               <a:rPr lang="es-MX" smtClean="0"/>
-              <a:t>‹Nº›</a:t>
+              <a:t>‹#›</a:t>
             </a:fld>
             <a:endParaRPr lang="es-MX"/>
           </a:p>
@@ -1822,7 +1822,7 @@
           <a:p>
             <a:fld id="{606ECCC5-4546-4098-9A3E-05B68676E7CD}" type="datetimeFigureOut">
               <a:rPr lang="es-MX" smtClean="0"/>
-              <a:t>04/07/2023</a:t>
+              <a:t>15/02/2025</a:t>
             </a:fld>
             <a:endParaRPr lang="es-MX"/>
           </a:p>
@@ -1864,7 +1864,7 @@
           <a:p>
             <a:fld id="{3B215A83-C96B-45C2-ABAB-8051C7893C1E}" type="slidenum">
               <a:rPr lang="es-MX" smtClean="0"/>
-              <a:t>‹Nº›</a:t>
+              <a:t>‹#›</a:t>
             </a:fld>
             <a:endParaRPr lang="es-MX"/>
           </a:p>
@@ -1925,7 +1925,7 @@
           </a:lstStyle>
           <a:p>
             <a:r>
-              <a:rPr lang="es-ES" smtClean="0"/>
+              <a:rPr lang="es-ES"/>
               <a:t>Haga clic para modificar el estilo de título del patrón</a:t>
             </a:r>
             <a:endParaRPr lang="es-MX"/>
@@ -1982,35 +1982,35 @@
           <a:p>
             <a:pPr lvl="0"/>
             <a:r>
-              <a:rPr lang="es-ES" smtClean="0"/>
+              <a:rPr lang="es-ES"/>
               <a:t>Editar el estilo de texto del patrón</a:t>
             </a:r>
           </a:p>
           <a:p>
             <a:pPr lvl="1"/>
             <a:r>
-              <a:rPr lang="es-ES" smtClean="0"/>
+              <a:rPr lang="es-ES"/>
               <a:t>Segundo nivel</a:t>
             </a:r>
           </a:p>
           <a:p>
             <a:pPr lvl="2"/>
             <a:r>
-              <a:rPr lang="es-ES" smtClean="0"/>
+              <a:rPr lang="es-ES"/>
               <a:t>Tercer nivel</a:t>
             </a:r>
           </a:p>
           <a:p>
             <a:pPr lvl="3"/>
             <a:r>
-              <a:rPr lang="es-ES" smtClean="0"/>
+              <a:rPr lang="es-ES"/>
               <a:t>Cuarto nivel</a:t>
             </a:r>
           </a:p>
           <a:p>
             <a:pPr lvl="4"/>
             <a:r>
-              <a:rPr lang="es-ES" smtClean="0"/>
+              <a:rPr lang="es-ES"/>
               <a:t>Quinto nivel</a:t>
             </a:r>
             <a:endParaRPr lang="es-MX"/>
@@ -2076,7 +2076,7 @@
           <a:p>
             <a:pPr lvl="0"/>
             <a:r>
-              <a:rPr lang="es-ES" smtClean="0"/>
+              <a:rPr lang="es-ES"/>
               <a:t>Editar el estilo de texto del patrón</a:t>
             </a:r>
           </a:p>
@@ -2099,7 +2099,7 @@
           <a:p>
             <a:fld id="{606ECCC5-4546-4098-9A3E-05B68676E7CD}" type="datetimeFigureOut">
               <a:rPr lang="es-MX" smtClean="0"/>
-              <a:t>04/07/2023</a:t>
+              <a:t>15/02/2025</a:t>
             </a:fld>
             <a:endParaRPr lang="es-MX"/>
           </a:p>
@@ -2141,7 +2141,7 @@
           <a:p>
             <a:fld id="{3B215A83-C96B-45C2-ABAB-8051C7893C1E}" type="slidenum">
               <a:rPr lang="es-MX" smtClean="0"/>
-              <a:t>‹Nº›</a:t>
+              <a:t>‹#›</a:t>
             </a:fld>
             <a:endParaRPr lang="es-MX"/>
           </a:p>
@@ -2202,7 +2202,7 @@
           </a:lstStyle>
           <a:p>
             <a:r>
-              <a:rPr lang="es-ES" smtClean="0"/>
+              <a:rPr lang="es-ES"/>
               <a:t>Haga clic para modificar el estilo de título del patrón</a:t>
             </a:r>
             <a:endParaRPr lang="es-MX"/>
@@ -2329,7 +2329,7 @@
           <a:p>
             <a:pPr lvl="0"/>
             <a:r>
-              <a:rPr lang="es-ES" smtClean="0"/>
+              <a:rPr lang="es-ES"/>
               <a:t>Editar el estilo de texto del patrón</a:t>
             </a:r>
           </a:p>
@@ -2352,7 +2352,7 @@
           <a:p>
             <a:fld id="{606ECCC5-4546-4098-9A3E-05B68676E7CD}" type="datetimeFigureOut">
               <a:rPr lang="es-MX" smtClean="0"/>
-              <a:t>04/07/2023</a:t>
+              <a:t>15/02/2025</a:t>
             </a:fld>
             <a:endParaRPr lang="es-MX"/>
           </a:p>
@@ -2394,7 +2394,7 @@
           <a:p>
             <a:fld id="{3B215A83-C96B-45C2-ABAB-8051C7893C1E}" type="slidenum">
               <a:rPr lang="es-MX" smtClean="0"/>
-              <a:t>‹Nº›</a:t>
+              <a:t>‹#›</a:t>
             </a:fld>
             <a:endParaRPr lang="es-MX"/>
           </a:p>
@@ -2461,7 +2461,7 @@
           <a:lstStyle/>
           <a:p>
             <a:r>
-              <a:rPr lang="es-ES" smtClean="0"/>
+              <a:rPr lang="es-ES"/>
               <a:t>Haga clic para modificar el estilo de título del patrón</a:t>
             </a:r>
             <a:endParaRPr lang="es-MX"/>
@@ -2495,35 +2495,35 @@
           <a:p>
             <a:pPr lvl="0"/>
             <a:r>
-              <a:rPr lang="es-ES" smtClean="0"/>
+              <a:rPr lang="es-ES"/>
               <a:t>Editar el estilo de texto del patrón</a:t>
             </a:r>
           </a:p>
           <a:p>
             <a:pPr lvl="1"/>
             <a:r>
-              <a:rPr lang="es-ES" smtClean="0"/>
+              <a:rPr lang="es-ES"/>
               <a:t>Segundo nivel</a:t>
             </a:r>
           </a:p>
           <a:p>
             <a:pPr lvl="2"/>
             <a:r>
-              <a:rPr lang="es-ES" smtClean="0"/>
+              <a:rPr lang="es-ES"/>
               <a:t>Tercer nivel</a:t>
             </a:r>
           </a:p>
           <a:p>
             <a:pPr lvl="3"/>
             <a:r>
-              <a:rPr lang="es-ES" smtClean="0"/>
+              <a:rPr lang="es-ES"/>
               <a:t>Cuarto nivel</a:t>
             </a:r>
           </a:p>
           <a:p>
             <a:pPr lvl="4"/>
             <a:r>
-              <a:rPr lang="es-ES" smtClean="0"/>
+              <a:rPr lang="es-ES"/>
               <a:t>Quinto nivel</a:t>
             </a:r>
             <a:endParaRPr lang="es-MX"/>
@@ -2565,7 +2565,7 @@
           <a:p>
             <a:fld id="{606ECCC5-4546-4098-9A3E-05B68676E7CD}" type="datetimeFigureOut">
               <a:rPr lang="es-MX" smtClean="0"/>
-              <a:t>04/07/2023</a:t>
+              <a:t>15/02/2025</a:t>
             </a:fld>
             <a:endParaRPr lang="es-MX"/>
           </a:p>
@@ -2643,7 +2643,7 @@
           <a:p>
             <a:fld id="{3B215A83-C96B-45C2-ABAB-8051C7893C1E}" type="slidenum">
               <a:rPr lang="es-MX" smtClean="0"/>
-              <a:t>‹Nº›</a:t>
+              <a:t>‹#›</a:t>
             </a:fld>
             <a:endParaRPr lang="es-MX"/>
           </a:p>
@@ -2993,10 +2993,9 @@
           <a:lstStyle/>
           <a:p>
             <a:r>
-              <a:rPr lang="es-MX" dirty="0" smtClean="0"/>
+              <a:rPr lang="es-MX" dirty="0"/>
               <a:t>Text 1</a:t>
             </a:r>
-            <a:endParaRPr lang="es-MX" dirty="0"/>
           </a:p>
         </p:txBody>
       </p:sp>
@@ -3023,10 +3022,9 @@
           <a:lstStyle/>
           <a:p>
             <a:r>
-              <a:rPr lang="es-MX" dirty="0" smtClean="0"/>
+              <a:rPr lang="es-MX" dirty="0"/>
               <a:t>Text</a:t>
             </a:r>
-            <a:endParaRPr lang="es-MX" dirty="0"/>
           </a:p>
         </p:txBody>
       </p:sp>
@@ -3053,10 +3051,9 @@
           <a:lstStyle/>
           <a:p>
             <a:r>
-              <a:rPr lang="es-MX" dirty="0" smtClean="0"/>
+              <a:rPr lang="es-MX" dirty="0"/>
               <a:t>Text</a:t>
             </a:r>
-            <a:endParaRPr lang="es-MX" dirty="0"/>
           </a:p>
         </p:txBody>
       </p:sp>
@@ -3158,6 +3155,42 @@
           </a:graphicData>
         </a:graphic>
       </p:graphicFrame>
+      <p:pic>
+        <p:nvPicPr>
+          <p:cNvPr id="5" name="Picture" descr="A green logo with white text&#10;&#10;AI-generated content may be incorrect.">
+            <a:extLst>
+              <a:ext uri="{FF2B5EF4-FFF2-40B4-BE49-F238E27FC236}">
+                <a16:creationId xmlns:a16="http://schemas.microsoft.com/office/drawing/2014/main" id="{AA132912-FD82-76A7-9C1C-7DBA5A67CC34}"/>
+              </a:ext>
+            </a:extLst>
+          </p:cNvPr>
+          <p:cNvPicPr>
+            <a:picLocks noChangeAspect="1"/>
+          </p:cNvPicPr>
+          <p:nvPr/>
+        </p:nvPicPr>
+        <p:blipFill>
+          <a:blip r:embed="rId2">
+            <a:extLst>
+              <a:ext uri="{28A0092B-C50C-407E-A947-70E740481C1C}">
+                <a14:useLocalDpi xmlns:a14="http://schemas.microsoft.com/office/drawing/2010/main" val="0"/>
+              </a:ext>
+            </a:extLst>
+          </a:blip>
+          <a:stretch>
+            <a:fillRect/>
+          </a:stretch>
+        </p:blipFill>
+        <p:spPr>
+          <a:xfrm>
+            <a:off x="4667250" y="2000250"/>
+            <a:ext cx="2857500" cy="2857500"/>
+          </a:xfrm>
+          <a:prstGeom prst="rect">
+            <a:avLst/>
+          </a:prstGeom>
+        </p:spPr>
+      </p:pic>
     </p:spTree>
     <p:extLst>
       <p:ext uri="{BB962C8B-B14F-4D97-AF65-F5344CB8AC3E}">
@@ -3211,22 +3244,21 @@
           <a:lstStyle/>
           <a:p>
             <a:r>
-              <a:rPr lang="es-MX" dirty="0" err="1" smtClean="0"/>
+              <a:rPr lang="es-MX" dirty="0" err="1"/>
               <a:t>Already</a:t>
             </a:r>
             <a:r>
-              <a:rPr lang="es-MX" dirty="0" smtClean="0"/>
+              <a:rPr lang="es-MX" dirty="0"/>
               <a:t> </a:t>
             </a:r>
             <a:r>
-              <a:rPr lang="es-MX" dirty="0" err="1" smtClean="0"/>
+              <a:rPr lang="es-MX" dirty="0" err="1"/>
               <a:t>exists</a:t>
             </a:r>
             <a:r>
-              <a:rPr lang="es-MX" dirty="0" smtClean="0"/>
+              <a:rPr lang="es-MX" dirty="0"/>
               <a:t>!</a:t>
             </a:r>
-            <a:endParaRPr lang="es-MX" dirty="0"/>
           </a:p>
         </p:txBody>
       </p:sp>
@@ -3253,10 +3285,9 @@
           <a:lstStyle/>
           <a:p>
             <a:r>
-              <a:rPr lang="es-MX" dirty="0" smtClean="0"/>
+              <a:rPr lang="es-MX" dirty="0"/>
               <a:t>Text</a:t>
             </a:r>
-            <a:endParaRPr lang="es-MX" dirty="0"/>
           </a:p>
         </p:txBody>
       </p:sp>

</xml_diff>